<commit_message>
slides7w show age/height slides
</commit_message>
<xml_diff>
--- a/fall11/slidesF11/slides7w.pptx
+++ b/fall11/slidesF11/slides7w.pptx
@@ -230,7 +230,7 @@
             <a:fld id="{7E67CB53-8D3C-47BE-A7FA-F662C961B657}" type="datetimeFigureOut">
               <a:rPr lang="en-US" smtClean="0"/>
               <a:pPr/>
-              <a:t>10/12/11</a:t>
+              <a:t>10/16/11</a:t>
             </a:fld>
             <a:endParaRPr lang="en-US"/>
           </a:p>
@@ -397,7 +397,7 @@
             <a:fld id="{EFF6E4C5-D825-46D1-9B47-4B12017997CB}" type="datetimeFigureOut">
               <a:rPr lang="en-US" smtClean="0"/>
               <a:pPr/>
-              <a:t>10/12/11</a:t>
+              <a:t>10/16/11</a:t>
             </a:fld>
             <a:endParaRPr lang="en-US"/>
           </a:p>
@@ -4952,37 +4952,7 @@
                 <a:uFillTx/>
                 <a:latin typeface="Comic Sans MS" pitchFamily="66" charset="0"/>
               </a:rPr>
-              <a:t>Albert R Meyer  </a:t>
-            </a:r>
-            <a:r>
-              <a:rPr kumimoji="0" lang="en-US" sz="1200" b="0" i="0" u="none" strike="noStrike" kern="1200" cap="none" spc="0" normalizeH="0" baseline="0" noProof="0" dirty="0" smtClean="0">
-                <a:ln>
-                  <a:noFill/>
-                </a:ln>
-                <a:solidFill>
-                  <a:schemeClr val="tx1"/>
-                </a:solidFill>
-                <a:effectLst/>
-                <a:uLnTx/>
-                <a:uFillTx/>
-                <a:latin typeface="Comic Sans MS" pitchFamily="66" charset="0"/>
-              </a:rPr>
-              <a:t>         October 19. </a:t>
-            </a:r>
-            <a:r>
-              <a:rPr kumimoji="0" lang="en-US" sz="1200" b="0" i="0" u="none" strike="noStrike" kern="1200" cap="none" spc="0" normalizeH="0" baseline="0" noProof="0" dirty="0" smtClean="0">
-                <a:ln>
-                  <a:noFill/>
-                </a:ln>
-                <a:solidFill>
-                  <a:schemeClr val="tx1"/>
-                </a:solidFill>
-                <a:effectLst/>
-                <a:uLnTx/>
-                <a:uFillTx/>
-                <a:latin typeface="Comic Sans MS" pitchFamily="66" charset="0"/>
-              </a:rPr>
-              <a:t>2011</a:t>
+              <a:t>Albert R Meyer           October 19. 2011</a:t>
             </a:r>
             <a:endParaRPr kumimoji="0" lang="en-US" sz="1200" b="0" i="0" u="none" strike="noStrike" kern="1200" cap="none" spc="0" normalizeH="0" baseline="0" noProof="0" dirty="0">
               <a:ln>
@@ -16447,7 +16417,7 @@
           <a:graphicData uri="http://schemas.openxmlformats.org/presentationml/2006/ole">
             <mc:AlternateContent xmlns:mc="http://schemas.openxmlformats.org/markup-compatibility/2006">
               <mc:Choice xmlns:v="urn:schemas-microsoft-com:vml" Requires="v">
-                <p:oleObj spid="_x0000_s103433" name="Equation" r:id="rId4" imgW="76200" imgH="165100" progId="Equation.DSMT4">
+                <p:oleObj spid="_x0000_s103437" name="Equation" r:id="rId4" imgW="76200" imgH="165100" progId="Equation.DSMT4">
                   <p:embed/>
                 </p:oleObj>
               </mc:Choice>
@@ -16517,7 +16487,7 @@
           <a:graphicData uri="http://schemas.openxmlformats.org/presentationml/2006/ole">
             <mc:AlternateContent xmlns:mc="http://schemas.openxmlformats.org/markup-compatibility/2006">
               <mc:Choice xmlns:v="urn:schemas-microsoft-com:vml" Requires="v">
-                <p:oleObj spid="_x0000_s103434" name="Equation" r:id="rId6" imgW="76200" imgH="165100" progId="Equation.DSMT4">
+                <p:oleObj spid="_x0000_s103438" name="Equation" r:id="rId6" imgW="76200" imgH="165100" progId="Equation.DSMT4">
                   <p:embed/>
                 </p:oleObj>
               </mc:Choice>
@@ -16640,7 +16610,7 @@
             <a:graphicData uri="http://schemas.openxmlformats.org/presentationml/2006/ole">
               <mc:AlternateContent xmlns:mc="http://schemas.openxmlformats.org/markup-compatibility/2006">
                 <mc:Choice xmlns:v="urn:schemas-microsoft-com:vml" Requires="v">
-                  <p:oleObj spid="_x0000_s103435" name="Equation" r:id="rId8" imgW="215900" imgH="990600" progId="Equation.DSMT4">
+                  <p:oleObj spid="_x0000_s103439" name="Equation" r:id="rId8" imgW="215900" imgH="990600" progId="Equation.DSMT4">
                     <p:embed/>
                   </p:oleObj>
                 </mc:Choice>
@@ -27535,7 +27505,7 @@
           <a:graphicData uri="http://schemas.openxmlformats.org/presentationml/2006/ole">
             <mc:AlternateContent xmlns:mc="http://schemas.openxmlformats.org/markup-compatibility/2006">
               <mc:Choice xmlns:v="urn:schemas-microsoft-com:vml" Requires="v">
-                <p:oleObj spid="_x0000_s80901" name="Equation" r:id="rId4" imgW="850900" imgH="355600" progId="Equation.DSMT4">
+                <p:oleObj spid="_x0000_s80903" name="Equation" r:id="rId4" imgW="850900" imgH="355600" progId="Equation.DSMT4">
                   <p:embed/>
                 </p:oleObj>
               </mc:Choice>
@@ -27983,7 +27953,7 @@
           <a:graphicData uri="http://schemas.openxmlformats.org/presentationml/2006/ole">
             <mc:AlternateContent xmlns:mc="http://schemas.openxmlformats.org/markup-compatibility/2006">
               <mc:Choice xmlns:v="urn:schemas-microsoft-com:vml" Requires="v">
-                <p:oleObj spid="_x0000_s55309" name="Equation" r:id="rId4" imgW="215900" imgH="1270000" progId="Equation.DSMT4">
+                <p:oleObj spid="_x0000_s55313" name="Equation" r:id="rId4" imgW="215900" imgH="1270000" progId="Equation.DSMT4">
                   <p:embed/>
                 </p:oleObj>
               </mc:Choice>
@@ -28312,7 +28282,7 @@
           <a:graphicData uri="http://schemas.openxmlformats.org/presentationml/2006/ole">
             <mc:AlternateContent xmlns:mc="http://schemas.openxmlformats.org/markup-compatibility/2006">
               <mc:Choice xmlns:v="urn:schemas-microsoft-com:vml" Requires="v">
-                <p:oleObj spid="_x0000_s55310" name="Equation" r:id="rId6" imgW="546100" imgH="609600" progId="Equation.DSMT4">
+                <p:oleObj spid="_x0000_s55314" name="Equation" r:id="rId6" imgW="546100" imgH="609600" progId="Equation.DSMT4">
                   <p:embed/>
                 </p:oleObj>
               </mc:Choice>
@@ -28382,7 +28352,7 @@
           <a:graphicData uri="http://schemas.openxmlformats.org/presentationml/2006/ole">
             <mc:AlternateContent xmlns:mc="http://schemas.openxmlformats.org/markup-compatibility/2006">
               <mc:Choice xmlns:v="urn:schemas-microsoft-com:vml" Requires="v">
-                <p:oleObj spid="_x0000_s55311" name="Equation" r:id="rId8" imgW="546100" imgH="177800" progId="Equation.DSMT4">
+                <p:oleObj spid="_x0000_s55315" name="Equation" r:id="rId8" imgW="546100" imgH="177800" progId="Equation.DSMT4">
                   <p:embed/>
                 </p:oleObj>
               </mc:Choice>
@@ -29420,7 +29390,7 @@
           <a:graphicData uri="http://schemas.openxmlformats.org/presentationml/2006/ole">
             <mc:AlternateContent xmlns:mc="http://schemas.openxmlformats.org/markup-compatibility/2006">
               <mc:Choice xmlns:v="urn:schemas-microsoft-com:vml" Requires="v">
-                <p:oleObj spid="_x0000_s107525" name="Equation" r:id="rId4" imgW="266400" imgH="939600" progId="Equation.DSMT4">
+                <p:oleObj spid="_x0000_s107527" name="Equation" r:id="rId4" imgW="266400" imgH="939600" progId="Equation.DSMT4">
                   <p:embed/>
                 </p:oleObj>
               </mc:Choice>
@@ -29658,7 +29628,7 @@
 </file>
 
 <file path=ppt/slides/slide33.xml><?xml version="1.0" encoding="utf-8"?>
-<p:sld xmlns:a="http://schemas.openxmlformats.org/drawingml/2006/main" xmlns:r="http://schemas.openxmlformats.org/officeDocument/2006/relationships" xmlns:p="http://schemas.openxmlformats.org/presentationml/2006/main" show="0">
+<p:sld xmlns:a="http://schemas.openxmlformats.org/drawingml/2006/main" xmlns:r="http://schemas.openxmlformats.org/officeDocument/2006/relationships" xmlns:p="http://schemas.openxmlformats.org/presentationml/2006/main">
   <p:cSld>
     <p:spTree>
       <p:nvGrpSpPr>
@@ -30449,7 +30419,7 @@
 </file>
 
 <file path=ppt/slides/slide34.xml><?xml version="1.0" encoding="utf-8"?>
-<p:sld xmlns:a="http://schemas.openxmlformats.org/drawingml/2006/main" xmlns:r="http://schemas.openxmlformats.org/officeDocument/2006/relationships" xmlns:p="http://schemas.openxmlformats.org/presentationml/2006/main" show="0">
+<p:sld xmlns:a="http://schemas.openxmlformats.org/drawingml/2006/main" xmlns:r="http://schemas.openxmlformats.org/officeDocument/2006/relationships" xmlns:p="http://schemas.openxmlformats.org/presentationml/2006/main">
   <p:cSld>
     <p:spTree>
       <p:nvGrpSpPr>
@@ -33251,7 +33221,7 @@
           <a:graphicData uri="http://schemas.openxmlformats.org/presentationml/2006/ole">
             <mc:AlternateContent xmlns:mc="http://schemas.openxmlformats.org/markup-compatibility/2006">
               <mc:Choice xmlns:v="urn:schemas-microsoft-com:vml" Requires="v">
-                <p:oleObj spid="_x0000_s31751" name="Equation" r:id="rId4" imgW="1320800" imgH="241300" progId="Equation.DSMT4">
+                <p:oleObj spid="_x0000_s31754" name="Equation" r:id="rId4" imgW="1320800" imgH="241300" progId="Equation.DSMT4">
                   <p:embed/>
                 </p:oleObj>
               </mc:Choice>
@@ -33401,7 +33371,7 @@
           <a:graphicData uri="http://schemas.openxmlformats.org/presentationml/2006/ole">
             <mc:AlternateContent xmlns:mc="http://schemas.openxmlformats.org/markup-compatibility/2006">
               <mc:Choice xmlns:v="urn:schemas-microsoft-com:vml" Requires="v">
-                <p:oleObj spid="_x0000_s31752" name="Equation" r:id="rId6" imgW="939800" imgH="241300" progId="Equation.DSMT4">
+                <p:oleObj spid="_x0000_s31755" name="Equation" r:id="rId6" imgW="939800" imgH="241300" progId="Equation.DSMT4">
                   <p:embed/>
                 </p:oleObj>
               </mc:Choice>

</xml_diff>

<commit_message>
slide7w tweak; stat on slides 7f'
</commit_message>
<xml_diff>
--- a/fall11/slidesF11/slides7w.pptx
+++ b/fall11/slidesF11/slides7w.pptx
@@ -234,7 +234,7 @@
             <a:fld id="{7E67CB53-8D3C-47BE-A7FA-F662C961B657}" type="datetimeFigureOut">
               <a:rPr lang="en-US" smtClean="0"/>
               <a:pPr/>
-              <a:t>10/18/11</a:t>
+              <a:t>10/19/11</a:t>
             </a:fld>
             <a:endParaRPr lang="en-US"/>
           </a:p>
@@ -401,7 +401,7 @@
             <a:fld id="{EFF6E4C5-D825-46D1-9B47-4B12017997CB}" type="datetimeFigureOut">
               <a:rPr lang="en-US" smtClean="0"/>
               <a:pPr/>
-              <a:t>10/18/11</a:t>
+              <a:t>10/19/11</a:t>
             </a:fld>
             <a:endParaRPr lang="en-US"/>
           </a:p>
@@ -18013,7 +18013,7 @@
           <a:graphicData uri="http://schemas.openxmlformats.org/presentationml/2006/ole">
             <mc:AlternateContent xmlns:mc="http://schemas.openxmlformats.org/markup-compatibility/2006">
               <mc:Choice xmlns:v="urn:schemas-microsoft-com:vml" Requires="v">
-                <p:oleObj spid="_x0000_s103471" name="Equation" r:id="rId4" imgW="76200" imgH="165100" progId="Equation.DSMT4">
+                <p:oleObj spid="_x0000_s103476" name="Equation" r:id="rId4" imgW="76200" imgH="165100" progId="Equation.DSMT4">
                   <p:embed/>
                 </p:oleObj>
               </mc:Choice>
@@ -18083,7 +18083,7 @@
           <a:graphicData uri="http://schemas.openxmlformats.org/presentationml/2006/ole">
             <mc:AlternateContent xmlns:mc="http://schemas.openxmlformats.org/markup-compatibility/2006">
               <mc:Choice xmlns:v="urn:schemas-microsoft-com:vml" Requires="v">
-                <p:oleObj spid="_x0000_s103472" name="Equation" r:id="rId6" imgW="76200" imgH="165100" progId="Equation.DSMT4">
+                <p:oleObj spid="_x0000_s103477" name="Equation" r:id="rId6" imgW="76200" imgH="165100" progId="Equation.DSMT4">
                   <p:embed/>
                 </p:oleObj>
               </mc:Choice>
@@ -18752,7 +18752,7 @@
             <a:graphicData uri="http://schemas.openxmlformats.org/presentationml/2006/ole">
               <mc:AlternateContent xmlns:mc="http://schemas.openxmlformats.org/markup-compatibility/2006">
                 <mc:Choice xmlns:v="urn:schemas-microsoft-com:vml" Requires="v">
-                  <p:oleObj spid="_x0000_s1039" name="Equation" r:id="rId4" imgW="215900" imgH="990600" progId="Equation.DSMT4">
+                  <p:oleObj spid="_x0000_s1042" name="Equation" r:id="rId4" imgW="215900" imgH="990600" progId="Equation.DSMT4">
                     <p:embed/>
                   </p:oleObj>
                 </mc:Choice>
@@ -21962,13 +21962,13 @@
   <p:clrMapOvr>
     <a:masterClrMapping/>
   </p:clrMapOvr>
-  <mc:AlternateContent xmlns:mc="http://schemas.openxmlformats.org/markup-compatibility/2006">
-    <mc:Choice xmlns:p14="http://schemas.microsoft.com/office/powerpoint/2010/main" Requires="p14">
+  <mc:AlternateContent xmlns:mc="http://schemas.openxmlformats.org/markup-compatibility/2006" xmlns:p14="http://schemas.microsoft.com/office/powerpoint/2010/main">
+    <mc:Choice Requires="p14">
       <p:transition spd="med" p14:dur="700">
         <p:fade/>
       </p:transition>
     </mc:Choice>
-    <mc:Fallback>
+    <mc:Fallback xmlns="">
       <p:transition xmlns:p14="http://schemas.microsoft.com/office/powerpoint/2010/main" spd="med">
         <p:fade/>
       </p:transition>
@@ -26472,13 +26472,13 @@
   <p:clrMapOvr>
     <a:masterClrMapping/>
   </p:clrMapOvr>
-  <mc:AlternateContent xmlns:mc="http://schemas.openxmlformats.org/markup-compatibility/2006">
-    <mc:Choice xmlns:p14="http://schemas.microsoft.com/office/powerpoint/2010/main" Requires="p14">
+  <mc:AlternateContent xmlns:mc="http://schemas.openxmlformats.org/markup-compatibility/2006" xmlns:p14="http://schemas.microsoft.com/office/powerpoint/2010/main">
+    <mc:Choice Requires="p14">
       <p:transition spd="med" p14:dur="600">
         <p:fade thruBlk="1"/>
       </p:transition>
     </mc:Choice>
-    <mc:Fallback>
+    <mc:Fallback xmlns="">
       <p:transition xmlns:p14="http://schemas.microsoft.com/office/powerpoint/2010/main" spd="med">
         <p:fade thruBlk="1"/>
       </p:transition>
@@ -27053,13 +27053,13 @@
   <p:clrMapOvr>
     <a:masterClrMapping/>
   </p:clrMapOvr>
-  <mc:AlternateContent xmlns:mc="http://schemas.openxmlformats.org/markup-compatibility/2006">
-    <mc:Choice xmlns:p14="http://schemas.microsoft.com/office/powerpoint/2010/main" Requires="p14">
+  <mc:AlternateContent xmlns:mc="http://schemas.openxmlformats.org/markup-compatibility/2006" xmlns:p14="http://schemas.microsoft.com/office/powerpoint/2010/main">
+    <mc:Choice Requires="p14">
       <p:transition spd="med" p14:dur="700">
         <p:fade thruBlk="1"/>
       </p:transition>
     </mc:Choice>
-    <mc:Fallback>
+    <mc:Fallback xmlns="">
       <p:transition xmlns:p14="http://schemas.microsoft.com/office/powerpoint/2010/main" spd="med">
         <p:fade thruBlk="1"/>
       </p:transition>
@@ -27496,9 +27496,6 @@
               </a:rPr>
               <a:t> </a:t>
             </a:r>
-            <a:endParaRPr lang="en-US" sz="5400" dirty="0" smtClean="0">
-              <a:latin typeface="Comic Sans MS" pitchFamily="66" charset="0"/>
-            </a:endParaRPr>
           </a:p>
           <a:p>
             <a:pPr marL="742950" indent="-285750"/>
@@ -27521,13 +27518,7 @@
               <a:rPr lang="en-US" sz="5400" dirty="0" smtClean="0">
                 <a:latin typeface="Comic Sans MS" pitchFamily="66" charset="0"/>
               </a:rPr>
-              <a:t> </a:t>
-            </a:r>
-            <a:r>
-              <a:rPr lang="en-US" sz="5400" dirty="0" smtClean="0">
-                <a:latin typeface="Comic Sans MS" pitchFamily="66" charset="0"/>
-              </a:rPr>
-              <a:t>to </a:t>
+              <a:t> to </a:t>
             </a:r>
             <a:r>
               <a:rPr lang="en-US" sz="5400" dirty="0" smtClean="0">
@@ -27560,19 +27551,7 @@
               <a:rPr lang="en-US" sz="5400" dirty="0" smtClean="0">
                 <a:latin typeface="Comic Sans MS" pitchFamily="66" charset="0"/>
               </a:rPr>
-              <a:t> </a:t>
-            </a:r>
-            <a:r>
-              <a:rPr lang="en-US" sz="5400" dirty="0" smtClean="0">
-                <a:latin typeface="Comic Sans MS" pitchFamily="66" charset="0"/>
-              </a:rPr>
-              <a:t>is </a:t>
-            </a:r>
-            <a:r>
-              <a:rPr lang="en-US" sz="5400" dirty="0" smtClean="0">
-                <a:latin typeface="Comic Sans MS" pitchFamily="66" charset="0"/>
-              </a:rPr>
-              <a:t>“indirect </a:t>
+              <a:t> is “indirect </a:t>
             </a:r>
             <a:r>
               <a:rPr lang="en-US" sz="5400" dirty="0" err="1" smtClean="0">
@@ -27595,12 +27574,6 @@
               </a:rPr>
               <a:t>v</a:t>
             </a:r>
-            <a:endParaRPr lang="en-US" sz="5400" dirty="0" smtClean="0">
-              <a:solidFill>
-                <a:srgbClr val="0000FF"/>
-              </a:solidFill>
-              <a:latin typeface="Comic Sans MS" pitchFamily="66" charset="0"/>
-            </a:endParaRPr>
           </a:p>
         </p:txBody>
       </p:sp>
@@ -28194,11 +28167,7 @@
             </a:pPr>
             <a:r>
               <a:rPr lang="en-US" sz="5400" dirty="0" smtClean="0"/>
-              <a:t>we saw 3 </a:t>
-            </a:r>
-            <a:r>
-              <a:rPr lang="en-US" sz="5400" dirty="0" smtClean="0"/>
-              <a:t>processors</a:t>
+              <a:t>we saw 3 processors</a:t>
             </a:r>
           </a:p>
           <a:p>
@@ -28674,7 +28643,7 @@
           <a:graphicData uri="http://schemas.openxmlformats.org/presentationml/2006/ole">
             <mc:AlternateContent xmlns:mc="http://schemas.openxmlformats.org/markup-compatibility/2006">
               <mc:Choice xmlns:v="urn:schemas-microsoft-com:vml" Requires="v">
-                <p:oleObj spid="_x0000_s80919" name="Equation" r:id="rId4" imgW="850900" imgH="355600" progId="Equation.DSMT4">
+                <p:oleObj spid="_x0000_s80922" name="Equation" r:id="rId4" imgW="850900" imgH="355600" progId="Equation.DSMT4">
                   <p:embed/>
                 </p:oleObj>
               </mc:Choice>
@@ -29122,7 +29091,7 @@
           <a:graphicData uri="http://schemas.openxmlformats.org/presentationml/2006/ole">
             <mc:AlternateContent xmlns:mc="http://schemas.openxmlformats.org/markup-compatibility/2006">
               <mc:Choice xmlns:v="urn:schemas-microsoft-com:vml" Requires="v">
-                <p:oleObj spid="_x0000_s55357" name="Equation" r:id="rId4" imgW="215900" imgH="1270000" progId="Equation.DSMT4">
+                <p:oleObj spid="_x0000_s55364" name="Equation" r:id="rId4" imgW="215900" imgH="1270000" progId="Equation.DSMT4">
                   <p:embed/>
                 </p:oleObj>
               </mc:Choice>
@@ -29457,7 +29426,7 @@
           <a:graphicData uri="http://schemas.openxmlformats.org/presentationml/2006/ole">
             <mc:AlternateContent xmlns:mc="http://schemas.openxmlformats.org/markup-compatibility/2006">
               <mc:Choice xmlns:v="urn:schemas-microsoft-com:vml" Requires="v">
-                <p:oleObj spid="_x0000_s55358" name="Equation" r:id="rId6" imgW="533400" imgH="596900" progId="Equation.DSMT4">
+                <p:oleObj spid="_x0000_s55365" name="Equation" r:id="rId6" imgW="533400" imgH="596900" progId="Equation.DSMT4">
                   <p:embed/>
                 </p:oleObj>
               </mc:Choice>
@@ -29521,7 +29490,7 @@
           <a:graphicData uri="http://schemas.openxmlformats.org/presentationml/2006/ole">
             <mc:AlternateContent xmlns:mc="http://schemas.openxmlformats.org/markup-compatibility/2006">
               <mc:Choice xmlns:v="urn:schemas-microsoft-com:vml" Requires="v">
-                <p:oleObj spid="_x0000_s55359" name="Equation" r:id="rId8" imgW="546100" imgH="177800" progId="Equation.DSMT4">
+                <p:oleObj spid="_x0000_s55366" name="Equation" r:id="rId8" imgW="546100" imgH="177800" progId="Equation.DSMT4">
                   <p:embed/>
                 </p:oleObj>
               </mc:Choice>
@@ -30368,11 +30337,7 @@
             </a:r>
             <a:r>
               <a:rPr lang="en-US" sz="4800" dirty="0" smtClean="0"/>
-              <a:t>DAG </a:t>
-            </a:r>
-            <a:r>
-              <a:rPr lang="en-US" sz="4800" dirty="0" smtClean="0"/>
-              <a:t>has</a:t>
+              <a:t>DAG has</a:t>
             </a:r>
           </a:p>
           <a:p>
@@ -30406,7 +30371,7 @@
                 <a:cs typeface="Symbol" charset="2"/>
                 <a:sym typeface="Euclid Symbol"/>
               </a:rPr>
-              <a:t>&gt;</a:t>
+              <a:t>&gt;        </a:t>
             </a:r>
             <a:r>
               <a:rPr lang="en-US" sz="4800" dirty="0" smtClean="0"/>
@@ -30593,7 +30558,7 @@
           <a:graphicData uri="http://schemas.openxmlformats.org/presentationml/2006/ole">
             <mc:AlternateContent xmlns:mc="http://schemas.openxmlformats.org/markup-compatibility/2006">
               <mc:Choice xmlns:v="urn:schemas-microsoft-com:vml" Requires="v">
-                <p:oleObj spid="_x0000_s107545" name="Equation" r:id="rId4" imgW="266400" imgH="939600" progId="Equation.DSMT4">
+                <p:oleObj spid="_x0000_s107548" name="Equation" r:id="rId4" imgW="266400" imgH="939600" progId="Equation.DSMT4">
                   <p:embed/>
                 </p:oleObj>
               </mc:Choice>
@@ -30920,11 +30885,7 @@
             </a:r>
             <a:r>
               <a:rPr lang="en-US" sz="4800" dirty="0" smtClean="0"/>
-              <a:t>DAG </a:t>
-            </a:r>
-            <a:r>
-              <a:rPr lang="en-US" sz="4800" dirty="0" smtClean="0"/>
-              <a:t>has</a:t>
+              <a:t>DAG has</a:t>
             </a:r>
           </a:p>
           <a:p>
@@ -31070,7 +31031,7 @@
           <a:graphicData uri="http://schemas.openxmlformats.org/presentationml/2006/ole">
             <mc:AlternateContent xmlns:mc="http://schemas.openxmlformats.org/markup-compatibility/2006">
               <mc:Choice xmlns:v="urn:schemas-microsoft-com:vml" Requires="v">
-                <p:oleObj spid="_x0000_s110606" name="Equation" r:id="rId4" imgW="241300" imgH="279400" progId="Equation.DSMT4">
+                <p:oleObj spid="_x0000_s110611" name="Equation" r:id="rId4" imgW="241300" imgH="279400" progId="Equation.DSMT4">
                   <p:embed/>
                 </p:oleObj>
               </mc:Choice>
@@ -31127,7 +31088,7 @@
           <a:graphicData uri="http://schemas.openxmlformats.org/presentationml/2006/ole">
             <mc:AlternateContent xmlns:mc="http://schemas.openxmlformats.org/markup-compatibility/2006">
               <mc:Choice xmlns:v="urn:schemas-microsoft-com:vml" Requires="v">
-                <p:oleObj spid="_x0000_s110607" name="Equation" r:id="rId6" imgW="241300" imgH="279400" progId="Equation.DSMT4">
+                <p:oleObj spid="_x0000_s110612" name="Equation" r:id="rId6" imgW="241300" imgH="279400" progId="Equation.DSMT4">
                   <p:embed/>
                 </p:oleObj>
               </mc:Choice>
@@ -31700,13 +31661,13 @@
   <p:clrMapOvr>
     <a:masterClrMapping/>
   </p:clrMapOvr>
-  <mc:AlternateContent xmlns:mc="http://schemas.openxmlformats.org/markup-compatibility/2006">
-    <mc:Choice xmlns:p14="http://schemas.microsoft.com/office/powerpoint/2010/main" Requires="p14">
+  <mc:AlternateContent xmlns:mc="http://schemas.openxmlformats.org/markup-compatibility/2006" xmlns:p14="http://schemas.microsoft.com/office/powerpoint/2010/main">
+    <mc:Choice Requires="p14">
       <p:transition spd="med" p14:dur="700">
         <p:fade/>
       </p:transition>
     </mc:Choice>
-    <mc:Fallback>
+    <mc:Fallback xmlns="">
       <p:transition xmlns:p14="http://schemas.microsoft.com/office/powerpoint/2010/main" spd="med">
         <p:fade/>
       </p:transition>
@@ -32101,7 +32062,7 @@
           <a:graphicData uri="http://schemas.openxmlformats.org/presentationml/2006/ole">
             <mc:AlternateContent xmlns:mc="http://schemas.openxmlformats.org/markup-compatibility/2006">
               <mc:Choice xmlns:v="urn:schemas-microsoft-com:vml" Requires="v">
-                <p:oleObj spid="_x0000_s111620" name="Equation" r:id="rId3" imgW="838200" imgH="406400" progId="Equation.DSMT4">
+                <p:oleObj spid="_x0000_s111623" name="Equation" r:id="rId3" imgW="838200" imgH="406400" progId="Equation.DSMT4">
                   <p:embed/>
                 </p:oleObj>
               </mc:Choice>
@@ -32146,13 +32107,13 @@
   <p:clrMapOvr>
     <a:masterClrMapping/>
   </p:clrMapOvr>
-  <mc:AlternateContent xmlns:mc="http://schemas.openxmlformats.org/markup-compatibility/2006">
-    <mc:Choice xmlns:p14="http://schemas.microsoft.com/office/powerpoint/2010/main" Requires="p14">
+  <mc:AlternateContent xmlns:mc="http://schemas.openxmlformats.org/markup-compatibility/2006" xmlns:p14="http://schemas.microsoft.com/office/powerpoint/2010/main">
+    <mc:Choice Requires="p14">
       <p:transition spd="med" p14:dur="700">
         <p:fade/>
       </p:transition>
     </mc:Choice>
-    <mc:Fallback>
+    <mc:Fallback xmlns="">
       <p:transition xmlns:p14="http://schemas.microsoft.com/office/powerpoint/2010/main" spd="med">
         <p:fade/>
       </p:transition>
@@ -34999,7 +34960,7 @@
           <a:graphicData uri="http://schemas.openxmlformats.org/presentationml/2006/ole">
             <mc:AlternateContent xmlns:mc="http://schemas.openxmlformats.org/markup-compatibility/2006">
               <mc:Choice xmlns:v="urn:schemas-microsoft-com:vml" Requires="v">
-                <p:oleObj spid="_x0000_s31784" name="Equation" r:id="rId4" imgW="1320800" imgH="241300" progId="Equation.DSMT4">
+                <p:oleObj spid="_x0000_s31789" name="Equation" r:id="rId4" imgW="1320800" imgH="241300" progId="Equation.DSMT4">
                   <p:embed/>
                 </p:oleObj>
               </mc:Choice>
@@ -35149,7 +35110,7 @@
           <a:graphicData uri="http://schemas.openxmlformats.org/presentationml/2006/ole">
             <mc:AlternateContent xmlns:mc="http://schemas.openxmlformats.org/markup-compatibility/2006">
               <mc:Choice xmlns:v="urn:schemas-microsoft-com:vml" Requires="v">
-                <p:oleObj spid="_x0000_s31785" name="Equation" r:id="rId6" imgW="939800" imgH="241300" progId="Equation.DSMT4">
+                <p:oleObj spid="_x0000_s31790" name="Equation" r:id="rId6" imgW="939800" imgH="241300" progId="Equation.DSMT4">
                   <p:embed/>
                 </p:oleObj>
               </mc:Choice>
@@ -36345,13 +36306,13 @@
   <p:clrMapOvr>
     <a:masterClrMapping/>
   </p:clrMapOvr>
-  <mc:AlternateContent xmlns:mc="http://schemas.openxmlformats.org/markup-compatibility/2006">
-    <mc:Choice xmlns:p14="http://schemas.microsoft.com/office/powerpoint/2010/main" Requires="p14">
+  <mc:AlternateContent xmlns:mc="http://schemas.openxmlformats.org/markup-compatibility/2006" xmlns:p14="http://schemas.microsoft.com/office/powerpoint/2010/main">
+    <mc:Choice Requires="p14">
       <p:transition spd="med" p14:dur="700">
         <p:fade/>
       </p:transition>
     </mc:Choice>
-    <mc:Fallback>
+    <mc:Fallback xmlns="">
       <p:transition xmlns:p14="http://schemas.microsoft.com/office/powerpoint/2010/main" spd="med">
         <p:fade/>
       </p:transition>

</xml_diff>